<commit_message>
Sunuma yeni best practice eklendi
</commit_message>
<xml_diff>
--- a/Kubernetes Sunum.pptx
+++ b/Kubernetes Sunum.pptx
@@ -265,7 +265,7 @@
           <a:p>
             <a:fld id="{A3FE0530-31D9-4735-8FB1-7BD3226239BC}" type="datetimeFigureOut">
               <a:rPr lang="tr-TR" smtClean="0"/>
-              <a:t>5.06.2020</a:t>
+              <a:t>6.06.2020</a:t>
             </a:fld>
             <a:endParaRPr lang="tr-TR"/>
           </a:p>
@@ -463,7 +463,7 @@
           <a:p>
             <a:fld id="{A3FE0530-31D9-4735-8FB1-7BD3226239BC}" type="datetimeFigureOut">
               <a:rPr lang="tr-TR" smtClean="0"/>
-              <a:t>5.06.2020</a:t>
+              <a:t>6.06.2020</a:t>
             </a:fld>
             <a:endParaRPr lang="tr-TR"/>
           </a:p>
@@ -671,7 +671,7 @@
           <a:p>
             <a:fld id="{A3FE0530-31D9-4735-8FB1-7BD3226239BC}" type="datetimeFigureOut">
               <a:rPr lang="tr-TR" smtClean="0"/>
-              <a:t>5.06.2020</a:t>
+              <a:t>6.06.2020</a:t>
             </a:fld>
             <a:endParaRPr lang="tr-TR"/>
           </a:p>
@@ -869,7 +869,7 @@
           <a:p>
             <a:fld id="{A3FE0530-31D9-4735-8FB1-7BD3226239BC}" type="datetimeFigureOut">
               <a:rPr lang="tr-TR" smtClean="0"/>
-              <a:t>5.06.2020</a:t>
+              <a:t>6.06.2020</a:t>
             </a:fld>
             <a:endParaRPr lang="tr-TR"/>
           </a:p>
@@ -1144,7 +1144,7 @@
           <a:p>
             <a:fld id="{A3FE0530-31D9-4735-8FB1-7BD3226239BC}" type="datetimeFigureOut">
               <a:rPr lang="tr-TR" smtClean="0"/>
-              <a:t>5.06.2020</a:t>
+              <a:t>6.06.2020</a:t>
             </a:fld>
             <a:endParaRPr lang="tr-TR"/>
           </a:p>
@@ -1409,7 +1409,7 @@
           <a:p>
             <a:fld id="{A3FE0530-31D9-4735-8FB1-7BD3226239BC}" type="datetimeFigureOut">
               <a:rPr lang="tr-TR" smtClean="0"/>
-              <a:t>5.06.2020</a:t>
+              <a:t>6.06.2020</a:t>
             </a:fld>
             <a:endParaRPr lang="tr-TR"/>
           </a:p>
@@ -1821,7 +1821,7 @@
           <a:p>
             <a:fld id="{A3FE0530-31D9-4735-8FB1-7BD3226239BC}" type="datetimeFigureOut">
               <a:rPr lang="tr-TR" smtClean="0"/>
-              <a:t>5.06.2020</a:t>
+              <a:t>6.06.2020</a:t>
             </a:fld>
             <a:endParaRPr lang="tr-TR"/>
           </a:p>
@@ -1962,7 +1962,7 @@
           <a:p>
             <a:fld id="{A3FE0530-31D9-4735-8FB1-7BD3226239BC}" type="datetimeFigureOut">
               <a:rPr lang="tr-TR" smtClean="0"/>
-              <a:t>5.06.2020</a:t>
+              <a:t>6.06.2020</a:t>
             </a:fld>
             <a:endParaRPr lang="tr-TR"/>
           </a:p>
@@ -2075,7 +2075,7 @@
           <a:p>
             <a:fld id="{A3FE0530-31D9-4735-8FB1-7BD3226239BC}" type="datetimeFigureOut">
               <a:rPr lang="tr-TR" smtClean="0"/>
-              <a:t>5.06.2020</a:t>
+              <a:t>6.06.2020</a:t>
             </a:fld>
             <a:endParaRPr lang="tr-TR"/>
           </a:p>
@@ -2386,7 +2386,7 @@
           <a:p>
             <a:fld id="{A3FE0530-31D9-4735-8FB1-7BD3226239BC}" type="datetimeFigureOut">
               <a:rPr lang="tr-TR" smtClean="0"/>
-              <a:t>5.06.2020</a:t>
+              <a:t>6.06.2020</a:t>
             </a:fld>
             <a:endParaRPr lang="tr-TR"/>
           </a:p>
@@ -2674,7 +2674,7 @@
           <a:p>
             <a:fld id="{A3FE0530-31D9-4735-8FB1-7BD3226239BC}" type="datetimeFigureOut">
               <a:rPr lang="tr-TR" smtClean="0"/>
-              <a:t>5.06.2020</a:t>
+              <a:t>6.06.2020</a:t>
             </a:fld>
             <a:endParaRPr lang="tr-TR"/>
           </a:p>
@@ -2915,7 +2915,7 @@
           <a:p>
             <a:fld id="{A3FE0530-31D9-4735-8FB1-7BD3226239BC}" type="datetimeFigureOut">
               <a:rPr lang="tr-TR" smtClean="0"/>
-              <a:t>5.06.2020</a:t>
+              <a:t>6.06.2020</a:t>
             </a:fld>
             <a:endParaRPr lang="tr-TR"/>
           </a:p>
@@ -5605,7 +5605,7 @@
         <p:spPr>
           <a:xfrm>
             <a:off x="383765" y="364812"/>
-            <a:ext cx="6253926" cy="3416320"/>
+            <a:ext cx="6253926" cy="4801314"/>
           </a:xfrm>
           <a:prstGeom prst="rect">
             <a:avLst/>
@@ -5740,6 +5740,85 @@
               <a:rPr lang="tr-TR" dirty="0"/>
               <a:t> harika bir teknoloji olsa da bazı özellikleri hala beta. Beta özellikleri kullanırken dikkatli olun.</a:t>
             </a:r>
+          </a:p>
+          <a:p>
+            <a:pPr marL="285750" indent="-285750">
+              <a:buFont typeface="Arial" panose="020B0604020202020204" pitchFamily="34" charset="0"/>
+              <a:buChar char="•"/>
+            </a:pPr>
+            <a:r>
+              <a:rPr lang="tr-TR" dirty="0"/>
+              <a:t>Nasıl olsa arkada </a:t>
+            </a:r>
+            <a:r>
+              <a:rPr lang="tr-TR" dirty="0" err="1"/>
+              <a:t>Docker</a:t>
+            </a:r>
+            <a:r>
+              <a:rPr lang="tr-TR" dirty="0"/>
+              <a:t> çalışıyor istediğim yerde </a:t>
+            </a:r>
+            <a:r>
+              <a:rPr lang="tr-TR" dirty="0" err="1"/>
+              <a:t>Docker</a:t>
+            </a:r>
+            <a:r>
+              <a:rPr lang="tr-TR" dirty="0"/>
+              <a:t> </a:t>
+            </a:r>
+            <a:r>
+              <a:rPr lang="tr-TR" dirty="0" err="1"/>
+              <a:t>run</a:t>
+            </a:r>
+            <a:r>
+              <a:rPr lang="tr-TR" dirty="0"/>
+              <a:t> ile istediğim yerde </a:t>
+            </a:r>
+            <a:r>
+              <a:rPr lang="tr-TR" dirty="0" err="1"/>
+              <a:t>Kubernetes</a:t>
+            </a:r>
+            <a:r>
+              <a:rPr lang="tr-TR" dirty="0"/>
+              <a:t> </a:t>
+            </a:r>
+            <a:r>
+              <a:rPr lang="tr-TR" dirty="0" err="1"/>
+              <a:t>yaml’ları</a:t>
+            </a:r>
+            <a:r>
+              <a:rPr lang="tr-TR" dirty="0"/>
+              <a:t> ile istediğim uygulamayı ayağa kaldırırım diye düşünüyorsanız, yapamazsınız </a:t>
+            </a:r>
+            <a:r>
+              <a:rPr lang="tr-TR" dirty="0" err="1"/>
+              <a:t>Kubernetes</a:t>
+            </a:r>
+            <a:r>
+              <a:rPr lang="tr-TR" dirty="0"/>
+              <a:t> </a:t>
+            </a:r>
+            <a:r>
+              <a:rPr lang="tr-TR" dirty="0" err="1"/>
+              <a:t>docker</a:t>
+            </a:r>
+            <a:r>
+              <a:rPr lang="tr-TR" dirty="0"/>
+              <a:t> </a:t>
+            </a:r>
+            <a:r>
+              <a:rPr lang="tr-TR" dirty="0" err="1"/>
+              <a:t>run</a:t>
+            </a:r>
+            <a:r>
+              <a:rPr lang="tr-TR" dirty="0"/>
+              <a:t> ile ayağa </a:t>
+            </a:r>
+            <a:r>
+              <a:rPr lang="tr-TR"/>
+              <a:t>kaldırdığınız uygulamaları temizler.</a:t>
+            </a:r>
+            <a:endParaRPr lang="tr-TR" dirty="0"/>
           </a:p>
         </p:txBody>
       </p:sp>

</xml_diff>